<commit_message>
New Update for Project Completion (Soft work completed)
</commit_message>
<xml_diff>
--- a/NIHAAL/zNeed/AS-GPS & EMBS_PPT.pptx
+++ b/NIHAAL/zNeed/AS-GPS & EMBS_PPT.pptx
@@ -313,7 +313,7 @@
             <a:fld id="{1D8BD707-D9CF-40AE-B4C6-C98DA3205C09}" type="datetimeFigureOut">
               <a:rPr lang="en-US" smtClean="0"/>
               <a:pPr/>
-              <a:t>11/13/2020</a:t>
+              <a:t>1/8/2021</a:t>
             </a:fld>
             <a:endParaRPr lang="en-US"/>
           </a:p>
@@ -480,7 +480,7 @@
             <a:fld id="{1D8BD707-D9CF-40AE-B4C6-C98DA3205C09}" type="datetimeFigureOut">
               <a:rPr lang="en-US" smtClean="0"/>
               <a:pPr/>
-              <a:t>11/13/2020</a:t>
+              <a:t>1/8/2021</a:t>
             </a:fld>
             <a:endParaRPr lang="en-US"/>
           </a:p>
@@ -657,7 +657,7 @@
             <a:fld id="{1D8BD707-D9CF-40AE-B4C6-C98DA3205C09}" type="datetimeFigureOut">
               <a:rPr lang="en-US" smtClean="0"/>
               <a:pPr/>
-              <a:t>11/13/2020</a:t>
+              <a:t>1/8/2021</a:t>
             </a:fld>
             <a:endParaRPr lang="en-US"/>
           </a:p>
@@ -824,7 +824,7 @@
             <a:fld id="{1D8BD707-D9CF-40AE-B4C6-C98DA3205C09}" type="datetimeFigureOut">
               <a:rPr lang="en-US" smtClean="0"/>
               <a:pPr/>
-              <a:t>11/13/2020</a:t>
+              <a:t>1/8/2021</a:t>
             </a:fld>
             <a:endParaRPr lang="en-US"/>
           </a:p>
@@ -1067,7 +1067,7 @@
             <a:fld id="{1D8BD707-D9CF-40AE-B4C6-C98DA3205C09}" type="datetimeFigureOut">
               <a:rPr lang="en-US" smtClean="0"/>
               <a:pPr/>
-              <a:t>11/13/2020</a:t>
+              <a:t>1/8/2021</a:t>
             </a:fld>
             <a:endParaRPr lang="en-US"/>
           </a:p>
@@ -1352,7 +1352,7 @@
             <a:fld id="{1D8BD707-D9CF-40AE-B4C6-C98DA3205C09}" type="datetimeFigureOut">
               <a:rPr lang="en-US" smtClean="0"/>
               <a:pPr/>
-              <a:t>11/13/2020</a:t>
+              <a:t>1/8/2021</a:t>
             </a:fld>
             <a:endParaRPr lang="en-US"/>
           </a:p>
@@ -1771,7 +1771,7 @@
             <a:fld id="{1D8BD707-D9CF-40AE-B4C6-C98DA3205C09}" type="datetimeFigureOut">
               <a:rPr lang="en-US" smtClean="0"/>
               <a:pPr/>
-              <a:t>11/13/2020</a:t>
+              <a:t>1/8/2021</a:t>
             </a:fld>
             <a:endParaRPr lang="en-US"/>
           </a:p>
@@ -1886,7 +1886,7 @@
             <a:fld id="{1D8BD707-D9CF-40AE-B4C6-C98DA3205C09}" type="datetimeFigureOut">
               <a:rPr lang="en-US" smtClean="0"/>
               <a:pPr/>
-              <a:t>11/13/2020</a:t>
+              <a:t>1/8/2021</a:t>
             </a:fld>
             <a:endParaRPr lang="en-US"/>
           </a:p>
@@ -1978,7 +1978,7 @@
             <a:fld id="{1D8BD707-D9CF-40AE-B4C6-C98DA3205C09}" type="datetimeFigureOut">
               <a:rPr lang="en-US" smtClean="0"/>
               <a:pPr/>
-              <a:t>11/13/2020</a:t>
+              <a:t>1/8/2021</a:t>
             </a:fld>
             <a:endParaRPr lang="en-US"/>
           </a:p>
@@ -2252,7 +2252,7 @@
             <a:fld id="{1D8BD707-D9CF-40AE-B4C6-C98DA3205C09}" type="datetimeFigureOut">
               <a:rPr lang="en-US" smtClean="0"/>
               <a:pPr/>
-              <a:t>11/13/2020</a:t>
+              <a:t>1/8/2021</a:t>
             </a:fld>
             <a:endParaRPr lang="en-US"/>
           </a:p>
@@ -2502,7 +2502,7 @@
             <a:fld id="{1D8BD707-D9CF-40AE-B4C6-C98DA3205C09}" type="datetimeFigureOut">
               <a:rPr lang="en-US" smtClean="0"/>
               <a:pPr/>
-              <a:t>11/13/2020</a:t>
+              <a:t>1/8/2021</a:t>
             </a:fld>
             <a:endParaRPr lang="en-US"/>
           </a:p>
@@ -2712,7 +2712,7 @@
             <a:fld id="{1D8BD707-D9CF-40AE-B4C6-C98DA3205C09}" type="datetimeFigureOut">
               <a:rPr lang="en-US" smtClean="0"/>
               <a:pPr/>
-              <a:t>11/13/2020</a:t>
+              <a:t>1/8/2021</a:t>
             </a:fld>
             <a:endParaRPr lang="en-US"/>
           </a:p>
@@ -5949,6 +5949,30 @@
               <a:t>1. M. Syed Nihaal Ahmed </a:t>
             </a:r>
             <a:r>
+              <a:rPr lang="en-US" sz="1800" b="1" smtClean="0">
+                <a:solidFill>
+                  <a:schemeClr val="tx1">
+                    <a:lumMod val="65000"/>
+                    <a:lumOff val="35000"/>
+                  </a:schemeClr>
+                </a:solidFill>
+                <a:latin typeface="Rockwell Condensed" pitchFamily="18" charset="0"/>
+              </a:rPr>
+              <a:t>(</a:t>
+            </a:r>
+            <a:r>
+              <a:rPr lang="en-US" sz="1800" b="1" smtClean="0">
+                <a:solidFill>
+                  <a:schemeClr val="tx1">
+                    <a:lumMod val="65000"/>
+                    <a:lumOff val="35000"/>
+                  </a:schemeClr>
+                </a:solidFill>
+                <a:latin typeface="Rockwell Condensed" pitchFamily="18" charset="0"/>
+              </a:rPr>
+              <a:t>17604231</a:t>
+            </a:r>
+            <a:r>
               <a:rPr lang="en-US" sz="1800" b="1" dirty="0" smtClean="0">
                 <a:solidFill>
                   <a:schemeClr val="tx1">
@@ -5958,7 +5982,7 @@
                 </a:solidFill>
                 <a:latin typeface="Rockwell Condensed" pitchFamily="18" charset="0"/>
               </a:rPr>
-              <a:t>(17607231) [CEO/FOUNDER - Dread Eye Studio]</a:t>
+              <a:t>) [CEO/FOUNDER - Dread Eye Studio]</a:t>
             </a:r>
           </a:p>
           <a:p>
@@ -7768,7 +7792,6 @@
               <a:rPr lang="en-US" sz="2100" dirty="0" smtClean="0"/>
               <a:t>. </a:t>
             </a:r>
-            <a:endParaRPr lang="en-US" sz="2100" dirty="0" smtClean="0"/>
           </a:p>
           <a:p>
             <a:pPr algn="just">
@@ -7777,11 +7800,7 @@
             </a:pPr>
             <a:r>
               <a:rPr lang="en-US" sz="2100" dirty="0" smtClean="0"/>
-              <a:t>It </a:t>
-            </a:r>
-            <a:r>
-              <a:rPr lang="en-US" sz="2100" dirty="0" smtClean="0"/>
-              <a:t>is the technology used to determine the </a:t>
+              <a:t>It is the technology used to determine the </a:t>
             </a:r>
             <a:r>
               <a:rPr lang="en-US" sz="2100" b="1" dirty="0" smtClean="0"/>
@@ -7799,7 +7818,6 @@
               <a:rPr lang="en-US" sz="2100" dirty="0" smtClean="0"/>
               <a:t>. </a:t>
             </a:r>
-            <a:endParaRPr lang="en-US" sz="2100" dirty="0" smtClean="0"/>
           </a:p>
           <a:p>
             <a:pPr algn="just">
@@ -7824,13 +7842,8 @@
             </a:r>
             <a:r>
               <a:rPr lang="en-US" sz="2100" dirty="0" smtClean="0"/>
-              <a:t> </a:t>
-            </a:r>
-            <a:r>
-              <a:rPr lang="en-US" sz="2100" dirty="0" smtClean="0"/>
-              <a:t>can even be stored and downloaded to a computer which can be used for analysis in future. </a:t>
-            </a:r>
-            <a:endParaRPr lang="en-US" sz="2100" dirty="0" smtClean="0"/>
+              <a:t> can even be stored and downloaded to a computer which can be used for analysis in future. </a:t>
+            </a:r>
           </a:p>
           <a:p>
             <a:pPr algn="just">
@@ -7839,11 +7852,7 @@
             </a:pPr>
             <a:r>
               <a:rPr lang="en-US" sz="2100" dirty="0" smtClean="0"/>
-              <a:t>The device includes modern hardware and software components that help to track and locate automobiles both online and offline</a:t>
-            </a:r>
-            <a:r>
-              <a:rPr lang="en-US" sz="2100" dirty="0" smtClean="0"/>
-              <a:t>.</a:t>
+              <a:t>The device includes modern hardware and software components that help to track and locate automobiles both online and offline.</a:t>
             </a:r>
           </a:p>
           <a:p>
@@ -7853,11 +7862,7 @@
             </a:pPr>
             <a:r>
               <a:rPr lang="en-US" sz="2100" dirty="0" smtClean="0"/>
-              <a:t>The </a:t>
-            </a:r>
-            <a:r>
-              <a:rPr lang="en-US" sz="2100" dirty="0" smtClean="0"/>
-              <a:t>vehicle unit incorporates the hardware part that is the </a:t>
+              <a:t>The vehicle unit incorporates the hardware part that is the </a:t>
             </a:r>
             <a:r>
               <a:rPr lang="en-US" sz="2100" b="1" dirty="0" smtClean="0"/>
@@ -7881,11 +7886,7 @@
             </a:r>
             <a:r>
               <a:rPr lang="en-US" sz="2100" dirty="0" smtClean="0"/>
-              <a:t>kept inside the vehicle that is to be tracked</a:t>
-            </a:r>
-            <a:r>
-              <a:rPr lang="en-US" sz="2100" dirty="0" smtClean="0"/>
-              <a:t>.</a:t>
+              <a:t>kept inside the vehicle that is to be tracked.</a:t>
             </a:r>
           </a:p>
           <a:p>
@@ -7905,7 +7906,6 @@
               <a:rPr lang="en-US" sz="2100" dirty="0" smtClean="0"/>
               <a:t>. </a:t>
             </a:r>
-            <a:endParaRPr lang="en-US" sz="2100" dirty="0" smtClean="0"/>
           </a:p>
         </p:txBody>
       </p:sp>
@@ -8072,7 +8072,6 @@
               <a:rPr lang="en-US" sz="2100" dirty="0" smtClean="0"/>
               <a:t>. </a:t>
             </a:r>
-            <a:endParaRPr lang="en-US" sz="2100" dirty="0" smtClean="0"/>
           </a:p>
           <a:p>
             <a:pPr algn="just">
@@ -8081,11 +8080,7 @@
             </a:pPr>
             <a:r>
               <a:rPr lang="en-US" sz="2100" dirty="0" smtClean="0"/>
-              <a:t>Primarily </a:t>
-            </a:r>
-            <a:r>
-              <a:rPr lang="en-US" sz="2100" dirty="0" smtClean="0"/>
-              <a:t>used for </a:t>
+              <a:t>Primarily used for </a:t>
             </a:r>
             <a:r>
               <a:rPr lang="en-US" sz="2100" b="1" dirty="0" smtClean="0"/>
@@ -8135,11 +8130,7 @@
             </a:r>
             <a:r>
               <a:rPr lang="en-US" sz="2100" dirty="0" smtClean="0"/>
-              <a:t> </a:t>
-            </a:r>
-            <a:r>
-              <a:rPr lang="en-US" sz="2100" dirty="0" smtClean="0"/>
-              <a:t>and </a:t>
+              <a:t> and </a:t>
             </a:r>
             <a:r>
               <a:rPr lang="en-US" sz="2100" b="1" dirty="0" smtClean="0"/>
@@ -8151,31 +8142,11 @@
             </a:r>
             <a:r>
               <a:rPr lang="en-US" sz="2100" b="1" dirty="0" smtClean="0"/>
-              <a:t>Cold </a:t>
-            </a:r>
-            <a:r>
-              <a:rPr lang="en-US" sz="2100" b="1" dirty="0" smtClean="0"/>
-              <a:t>War</a:t>
+              <a:t>Cold War</a:t>
             </a:r>
             <a:r>
               <a:rPr lang="en-US" sz="2100" dirty="0" smtClean="0"/>
-              <a:t>, </a:t>
-            </a:r>
-            <a:r>
-              <a:rPr lang="en-US" sz="2100" dirty="0" smtClean="0"/>
-              <a:t>t</a:t>
-            </a:r>
-            <a:r>
-              <a:rPr lang="en-US" sz="2100" dirty="0" smtClean="0"/>
-              <a:t>he </a:t>
-            </a:r>
-            <a:r>
-              <a:rPr lang="en-US" sz="2100" dirty="0" smtClean="0"/>
-              <a:t>Soviet-launched spacecraft Sputnik. Since its introduction in the 1960s, GPS has developed into a larger and more advanced satellite network constellation that orbits Earth at fixed points in space to send signals to anyone with a GPS receiver</a:t>
-            </a:r>
-            <a:r>
-              <a:rPr lang="en-US" sz="2100" dirty="0" smtClean="0"/>
-              <a:t>.</a:t>
+              <a:t>, the Soviet-launched spacecraft Sputnik. Since its introduction in the 1960s, GPS has developed into a larger and more advanced satellite network constellation that orbits Earth at fixed points in space to send signals to anyone with a GPS receiver.</a:t>
             </a:r>
           </a:p>
           <a:p>
@@ -8203,7 +8174,6 @@
               <a:rPr lang="en-US" sz="2100" dirty="0" smtClean="0"/>
               <a:t>that enables us to display a devices exact position anywhere on the planet. </a:t>
             </a:r>
-            <a:endParaRPr lang="en-US" sz="2100" dirty="0" smtClean="0"/>
           </a:p>
           <a:p>
             <a:pPr algn="just">
@@ -8226,7 +8196,6 @@
               <a:rPr lang="en-US" sz="2100" b="1" dirty="0" smtClean="0"/>
               <a:t>pinpoint where the satellite was along its orbit.</a:t>
             </a:r>
-            <a:endParaRPr lang="en-US" sz="2100" b="1" dirty="0" smtClean="0"/>
           </a:p>
         </p:txBody>
       </p:sp>

</xml_diff>